<commit_message>
#réalisation du diagramme de Venn sur les pingouins
</commit_message>
<xml_diff>
--- a/tutorial_data_analysis - MQDS 2023.pptx
+++ b/tutorial_data_analysis - MQDS 2023.pptx
@@ -17464,53 +17464,6 @@
       </p:sp>
       <p:pic>
         <p:nvPicPr>
-          <p:cNvPr id="1026" name="Picture 2">
-            <a:extLst>
-              <a:ext uri="{FF2B5EF4-FFF2-40B4-BE49-F238E27FC236}">
-                <a16:creationId xmlns:a16="http://schemas.microsoft.com/office/drawing/2014/main" id="{D80367B5-1411-3442-9617-20E4512E4B59}"/>
-              </a:ext>
-            </a:extLst>
-          </p:cNvPr>
-          <p:cNvPicPr>
-            <a:picLocks noChangeAspect="1" noChangeArrowheads="1"/>
-          </p:cNvPicPr>
-          <p:nvPr/>
-        </p:nvPicPr>
-        <p:blipFill>
-          <a:blip r:embed="rId2">
-            <a:extLst>
-              <a:ext uri="{28A0092B-C50C-407E-A947-70E740481C1C}">
-                <a14:useLocalDpi xmlns:a14="http://schemas.microsoft.com/office/drawing/2010/main" val="0"/>
-              </a:ext>
-            </a:extLst>
-          </a:blip>
-          <a:srcRect/>
-          <a:stretch>
-            <a:fillRect/>
-          </a:stretch>
-        </p:blipFill>
-        <p:spPr bwMode="auto">
-          <a:xfrm>
-            <a:off x="5791572" y="2492896"/>
-            <a:ext cx="3672408" cy="3672408"/>
-          </a:xfrm>
-          <a:prstGeom prst="rect">
-            <a:avLst/>
-          </a:prstGeom>
-          <a:noFill/>
-          <a:extLst>
-            <a:ext uri="{909E8E84-426E-40DD-AFC4-6F175D3DCCD1}">
-              <a14:hiddenFill xmlns:a14="http://schemas.microsoft.com/office/drawing/2010/main">
-                <a:solidFill>
-                  <a:srgbClr val="FFFFFF"/>
-                </a:solidFill>
-              </a14:hiddenFill>
-            </a:ext>
-          </a:extLst>
-        </p:spPr>
-      </p:pic>
-      <p:pic>
-        <p:nvPicPr>
           <p:cNvPr id="4" name="Image 3">
             <a:extLst>
               <a:ext uri="{FF2B5EF4-FFF2-40B4-BE49-F238E27FC236}">
@@ -17524,7 +17477,7 @@
           <p:nvPr/>
         </p:nvPicPr>
         <p:blipFill>
-          <a:blip r:embed="rId3"/>
+          <a:blip r:embed="rId2"/>
           <a:stretch>
             <a:fillRect/>
           </a:stretch>
@@ -17533,6 +17486,42 @@
           <a:xfrm>
             <a:off x="143508" y="2636912"/>
             <a:ext cx="4804543" cy="4094237"/>
+          </a:xfrm>
+          <a:prstGeom prst="rect">
+            <a:avLst/>
+          </a:prstGeom>
+        </p:spPr>
+      </p:pic>
+      <p:pic>
+        <p:nvPicPr>
+          <p:cNvPr id="5" name="Image 4">
+            <a:extLst>
+              <a:ext uri="{FF2B5EF4-FFF2-40B4-BE49-F238E27FC236}">
+                <a16:creationId xmlns:a16="http://schemas.microsoft.com/office/drawing/2014/main" id="{4E97ABE0-693A-6E23-9BC9-B9BF55CC1B57}"/>
+              </a:ext>
+            </a:extLst>
+          </p:cNvPr>
+          <p:cNvPicPr>
+            <a:picLocks noChangeAspect="1"/>
+          </p:cNvPicPr>
+          <p:nvPr/>
+        </p:nvPicPr>
+        <p:blipFill>
+          <a:blip r:embed="rId3" cstate="print">
+            <a:extLst>
+              <a:ext uri="{28A0092B-C50C-407E-A947-70E740481C1C}">
+                <a14:useLocalDpi xmlns:a14="http://schemas.microsoft.com/office/drawing/2010/main" val="0"/>
+              </a:ext>
+            </a:extLst>
+          </a:blip>
+          <a:stretch>
+            <a:fillRect/>
+          </a:stretch>
+        </p:blipFill>
+        <p:spPr>
+          <a:xfrm>
+            <a:off x="5503540" y="2384424"/>
+            <a:ext cx="3705277" cy="3705277"/>
           </a:xfrm>
           <a:prstGeom prst="rect">
             <a:avLst/>

</xml_diff>

<commit_message>
# diagramme de Venn corrigé
</commit_message>
<xml_diff>
--- a/tutorial_data_analysis - MQDS 2023.pptx
+++ b/tutorial_data_analysis - MQDS 2023.pptx
@@ -1227,7 +1227,7 @@
             <a:fld id="{B4DB4E30-313A-40FC-AE80-331955E131F4}" type="datetimeFigureOut">
               <a:rPr lang="fr-FR" smtClean="0"/>
               <a:pPr/>
-              <a:t>02/06/2023</a:t>
+              <a:t>09/06/2023</a:t>
             </a:fld>
             <a:endParaRPr lang="fr-FR"/>
           </a:p>
@@ -17494,10 +17494,10 @@
       </p:pic>
       <p:pic>
         <p:nvPicPr>
-          <p:cNvPr id="5" name="Image 4">
+          <p:cNvPr id="6" name="Image 5">
             <a:extLst>
               <a:ext uri="{FF2B5EF4-FFF2-40B4-BE49-F238E27FC236}">
-                <a16:creationId xmlns:a16="http://schemas.microsoft.com/office/drawing/2014/main" id="{4E97ABE0-693A-6E23-9BC9-B9BF55CC1B57}"/>
+                <a16:creationId xmlns:a16="http://schemas.microsoft.com/office/drawing/2014/main" id="{B29B3161-BFA4-62F3-0684-92009A692960}"/>
               </a:ext>
             </a:extLst>
           </p:cNvPr>
@@ -17520,8 +17520,8 @@
         </p:blipFill>
         <p:spPr>
           <a:xfrm>
-            <a:off x="5503540" y="2384424"/>
-            <a:ext cx="3705277" cy="3705277"/>
+            <a:off x="5338951" y="2290589"/>
+            <a:ext cx="4440560" cy="4440560"/>
           </a:xfrm>
           <a:prstGeom prst="rect">
             <a:avLst/>

</xml_diff>